<commit_message>
Add Matlab TPP CODE
</commit_message>
<xml_diff>
--- a/Ideas of Gerber2NGC.pptx
+++ b/Ideas of Gerber2NGC.pptx
@@ -104,6 +104,11 @@
       </a:defRPr>
     </a:lvl9pPr>
   </p:defaultTextStyle>
+  <p:extLst>
+    <p:ext uri="{EFAFB233-063F-42B5-8137-9DF3F51BA10A}">
+      <p15:sldGuideLst xmlns:p15="http://schemas.microsoft.com/office/powerpoint/2012/main"/>
+    </p:ext>
+  </p:extLst>
 </p:presentation>
 </file>
 
@@ -3662,7 +3667,7 @@
         <p:spPr>
           <a:xfrm>
             <a:off x="4487033" y="675113"/>
-            <a:ext cx="1726306" cy="369332"/>
+            <a:ext cx="2811539" cy="369332"/>
           </a:xfrm>
           <a:prstGeom prst="rect">
             <a:avLst/>
@@ -3683,7 +3688,7 @@
                   </a:schemeClr>
                 </a:solidFill>
               </a:rPr>
-              <a:t>Feature#1: trace</a:t>
+              <a:t>Feature#1: trace (&lt;=0.4mm)</a:t>
             </a:r>
           </a:p>
         </p:txBody>
@@ -3703,7 +3708,7 @@
         <p:spPr>
           <a:xfrm>
             <a:off x="4487033" y="1287093"/>
-            <a:ext cx="1694182" cy="369332"/>
+            <a:ext cx="2663999" cy="369332"/>
           </a:xfrm>
           <a:prstGeom prst="rect">
             <a:avLst/>
@@ -3724,7 +3729,7 @@
                   </a:schemeClr>
                 </a:solidFill>
               </a:rPr>
-              <a:t>Feature#2: pads</a:t>
+              <a:t>Feature#2: pads (&gt;0.4mm)</a:t>
             </a:r>
           </a:p>
         </p:txBody>

</xml_diff>